<commit_message>
edit incexcbinom.pptx, add state-machines.pptx derived-variables.pptx
</commit_message>
<xml_diff>
--- a/spring13/slides13/incexcbinom.pptx
+++ b/spring13/slides13/incexcbinom.pptx
@@ -28,7 +28,7 @@
     <p:sldId id="589" r:id="rId16"/>
     <p:sldId id="566" r:id="rId17"/>
     <p:sldId id="590" r:id="rId18"/>
-    <p:sldId id="594" r:id="rId19"/>
+    <p:sldId id="596" r:id="rId19"/>
   </p:sldIdLst>
   <p:sldSz cx="9144000" cy="6858000" type="screen4x3"/>
   <p:notesSz cx="9601200" cy="7315200"/>
@@ -3649,7 +3649,7 @@
           <a:graphicData uri="http://schemas.openxmlformats.org/presentationml/2006/ole">
             <mc:AlternateContent xmlns:mc="http://schemas.openxmlformats.org/markup-compatibility/2006">
               <mc:Choice xmlns:v="urn:schemas-microsoft-com:vml" Requires="v">
-                <p:oleObj spid="_x0000_s218126" name="Equation" r:id="rId4" imgW="1346200" imgH="355600" progId="Equation.DSMT4">
+                <p:oleObj spid="_x0000_s218130" name="Equation" r:id="rId4" imgW="1346200" imgH="355600" progId="Equation.DSMT4">
                   <p:embed/>
                 </p:oleObj>
               </mc:Choice>
@@ -4149,7 +4149,7 @@
           <a:graphicData uri="http://schemas.openxmlformats.org/presentationml/2006/ole">
             <mc:AlternateContent xmlns:mc="http://schemas.openxmlformats.org/markup-compatibility/2006">
               <mc:Choice xmlns:v="urn:schemas-microsoft-com:vml" Requires="v">
-                <p:oleObj spid="_x0000_s234514" name="Equation" r:id="rId3" imgW="1816100" imgH="381000" progId="Equation.DSMT4">
+                <p:oleObj spid="_x0000_s234521" name="Equation" r:id="rId3" imgW="1816100" imgH="381000" progId="Equation.DSMT4">
                   <p:embed/>
                 </p:oleObj>
               </mc:Choice>
@@ -4206,7 +4206,7 @@
           <a:graphicData uri="http://schemas.openxmlformats.org/presentationml/2006/ole">
             <mc:AlternateContent xmlns:mc="http://schemas.openxmlformats.org/markup-compatibility/2006">
               <mc:Choice xmlns:v="urn:schemas-microsoft-com:vml" Requires="v">
-                <p:oleObj spid="_x0000_s234515" name="Equation" r:id="rId5" imgW="406400" imgH="292100" progId="Equation.DSMT4">
+                <p:oleObj spid="_x0000_s234522" name="Equation" r:id="rId5" imgW="406400" imgH="292100" progId="Equation.DSMT4">
                   <p:embed/>
                 </p:oleObj>
               </mc:Choice>
@@ -4272,12 +4272,6 @@
               </a:rPr>
               <a:t>QED</a:t>
             </a:r>
-            <a:endParaRPr lang="en-US" sz="6600" dirty="0" smtClean="0">
-              <a:solidFill>
-                <a:srgbClr val="90096D"/>
-              </a:solidFill>
-              <a:latin typeface="Comic Sans MS" pitchFamily="66" charset="0"/>
-            </a:endParaRPr>
           </a:p>
         </p:txBody>
       </p:sp>
@@ -4291,13 +4285,13 @@
   <p:clrMapOvr>
     <a:masterClrMapping/>
   </p:clrMapOvr>
-  <mc:AlternateContent xmlns:mc="http://schemas.openxmlformats.org/markup-compatibility/2006">
-    <mc:Choice xmlns:p14="http://schemas.microsoft.com/office/powerpoint/2010/main" Requires="p14">
+  <mc:AlternateContent xmlns:mc="http://schemas.openxmlformats.org/markup-compatibility/2006" xmlns:p14="http://schemas.microsoft.com/office/powerpoint/2010/main">
+    <mc:Choice Requires="p14">
       <p:transition spd="slow" p14:dur="1200" advClick="0">
         <p:fade thruBlk="1"/>
       </p:transition>
     </mc:Choice>
-    <mc:Fallback>
+    <mc:Fallback xmlns="">
       <p:transition xmlns:p14="http://schemas.microsoft.com/office/powerpoint/2010/main" spd="slow" advClick="0">
         <p:fade thruBlk="1"/>
       </p:transition>
@@ -4991,7 +4985,7 @@
           <a:graphicData uri="http://schemas.openxmlformats.org/presentationml/2006/ole">
             <mc:AlternateContent xmlns:mc="http://schemas.openxmlformats.org/markup-compatibility/2006">
               <mc:Choice xmlns:v="urn:schemas-microsoft-com:vml" Requires="v">
-                <p:oleObj spid="_x0000_s240646" name="Equation" r:id="rId3" imgW="1574800" imgH="533400" progId="Equation.DSMT4">
+                <p:oleObj spid="_x0000_s240650" name="Equation" r:id="rId3" imgW="1574800" imgH="533400" progId="Equation.DSMT4">
                   <p:embed/>
                 </p:oleObj>
               </mc:Choice>
@@ -5036,13 +5030,13 @@
   <p:clrMapOvr>
     <a:masterClrMapping/>
   </p:clrMapOvr>
-  <mc:AlternateContent xmlns:mc="http://schemas.openxmlformats.org/markup-compatibility/2006">
-    <mc:Choice xmlns:p14="http://schemas.microsoft.com/office/powerpoint/2010/main" Requires="p14">
+  <mc:AlternateContent xmlns:mc="http://schemas.openxmlformats.org/markup-compatibility/2006" xmlns:p14="http://schemas.microsoft.com/office/powerpoint/2010/main">
+    <mc:Choice Requires="p14">
       <p:transition spd="slow" p14:dur="900" advClick="0">
         <p:fade thruBlk="1"/>
       </p:transition>
     </mc:Choice>
-    <mc:Fallback>
+    <mc:Fallback xmlns="">
       <p:transition xmlns:p14="http://schemas.microsoft.com/office/powerpoint/2010/main" spd="slow" advClick="0">
         <p:fade thruBlk="1"/>
       </p:transition>
@@ -5398,7 +5392,7 @@
           <a:graphicData uri="http://schemas.openxmlformats.org/presentationml/2006/ole">
             <mc:AlternateContent xmlns:mc="http://schemas.openxmlformats.org/markup-compatibility/2006">
               <mc:Choice xmlns:v="urn:schemas-microsoft-com:vml" Requires="v">
-                <p:oleObj spid="_x0000_s237576" name="Equation" r:id="rId3" imgW="1638300" imgH="495300" progId="Equation.DSMT4">
+                <p:oleObj spid="_x0000_s237580" name="Equation" r:id="rId3" imgW="1638300" imgH="495300" progId="Equation.DSMT4">
                   <p:embed/>
                 </p:oleObj>
               </mc:Choice>
@@ -5443,13 +5437,13 @@
   <p:clrMapOvr>
     <a:masterClrMapping/>
   </p:clrMapOvr>
-  <mc:AlternateContent xmlns:mc="http://schemas.openxmlformats.org/markup-compatibility/2006">
-    <mc:Choice xmlns:p14="http://schemas.microsoft.com/office/powerpoint/2010/main" Requires="p14">
+  <mc:AlternateContent xmlns:mc="http://schemas.openxmlformats.org/markup-compatibility/2006" xmlns:p14="http://schemas.microsoft.com/office/powerpoint/2010/main">
+    <mc:Choice Requires="p14">
       <p:transition spd="slow" p14:dur="800" advClick="0">
         <p:fade/>
       </p:transition>
     </mc:Choice>
-    <mc:Fallback>
+    <mc:Fallback xmlns="">
       <p:transition xmlns:p14="http://schemas.microsoft.com/office/powerpoint/2010/main" spd="slow" advClick="0">
         <p:fade/>
       </p:transition>
@@ -5698,7 +5692,7 @@
           <a:graphicData uri="http://schemas.openxmlformats.org/presentationml/2006/ole">
             <mc:AlternateContent xmlns:mc="http://schemas.openxmlformats.org/markup-compatibility/2006">
               <mc:Choice xmlns:v="urn:schemas-microsoft-com:vml" Requires="v">
-                <p:oleObj spid="_x0000_s242691" name="Equation" r:id="rId3" imgW="1790700" imgH="495300" progId="Equation.DSMT4">
+                <p:oleObj spid="_x0000_s242695" name="Equation" r:id="rId3" imgW="1790700" imgH="495300" progId="Equation.DSMT4">
                   <p:embed/>
                 </p:oleObj>
               </mc:Choice>
@@ -5743,13 +5737,13 @@
   <p:clrMapOvr>
     <a:masterClrMapping/>
   </p:clrMapOvr>
-  <mc:AlternateContent xmlns:mc="http://schemas.openxmlformats.org/markup-compatibility/2006">
-    <mc:Choice xmlns:p14="http://schemas.microsoft.com/office/powerpoint/2010/main" Requires="p14">
+  <mc:AlternateContent xmlns:mc="http://schemas.openxmlformats.org/markup-compatibility/2006" xmlns:p14="http://schemas.microsoft.com/office/powerpoint/2010/main">
+    <mc:Choice Requires="p14">
       <p:transition spd="slow" p14:dur="800" advClick="0">
         <p:fade/>
       </p:transition>
     </mc:Choice>
-    <mc:Fallback>
+    <mc:Fallback xmlns="">
       <p:transition xmlns:p14="http://schemas.microsoft.com/office/powerpoint/2010/main" spd="slow" advClick="0">
         <p:fade/>
       </p:transition>
@@ -5922,7 +5916,7 @@
           <a:graphicData uri="http://schemas.openxmlformats.org/presentationml/2006/ole">
             <mc:AlternateContent xmlns:mc="http://schemas.openxmlformats.org/markup-compatibility/2006">
               <mc:Choice xmlns:v="urn:schemas-microsoft-com:vml" Requires="v">
-                <p:oleObj spid="_x0000_s244740" name="Equation" r:id="rId3" imgW="1790700" imgH="495300" progId="Equation.DSMT4">
+                <p:oleObj spid="_x0000_s244744" name="Equation" r:id="rId3" imgW="1790700" imgH="495300" progId="Equation.DSMT4">
                   <p:embed/>
                 </p:oleObj>
               </mc:Choice>
@@ -5967,13 +5961,13 @@
   <p:clrMapOvr>
     <a:masterClrMapping/>
   </p:clrMapOvr>
-  <mc:AlternateContent xmlns:mc="http://schemas.openxmlformats.org/markup-compatibility/2006">
-    <mc:Choice xmlns:p14="http://schemas.microsoft.com/office/powerpoint/2010/main" Requires="p14">
+  <mc:AlternateContent xmlns:mc="http://schemas.openxmlformats.org/markup-compatibility/2006" xmlns:p14="http://schemas.microsoft.com/office/powerpoint/2010/main">
+    <mc:Choice Requires="p14">
       <p:transition spd="slow" p14:dur="800" advClick="0">
         <p:fade/>
       </p:transition>
     </mc:Choice>
-    <mc:Fallback>
+    <mc:Fallback xmlns="">
       <p:transition xmlns:p14="http://schemas.microsoft.com/office/powerpoint/2010/main" spd="slow" advClick="0">
         <p:fade/>
       </p:transition>
@@ -6229,7 +6223,7 @@
           <a:graphicData uri="http://schemas.openxmlformats.org/presentationml/2006/ole">
             <mc:AlternateContent xmlns:mc="http://schemas.openxmlformats.org/markup-compatibility/2006">
               <mc:Choice xmlns:v="urn:schemas-microsoft-com:vml" Requires="v">
-                <p:oleObj spid="_x0000_s205956" name="Equation" r:id="rId4" imgW="139700" imgH="215900" progId="Equation.DSMT4">
+                <p:oleObj spid="_x0000_s205969" name="Equation" r:id="rId4" imgW="139700" imgH="215900" progId="Equation.DSMT4">
                   <p:embed/>
                 </p:oleObj>
               </mc:Choice>
@@ -6286,7 +6280,7 @@
           <a:graphicData uri="http://schemas.openxmlformats.org/presentationml/2006/ole">
             <mc:AlternateContent xmlns:mc="http://schemas.openxmlformats.org/markup-compatibility/2006">
               <mc:Choice xmlns:v="urn:schemas-microsoft-com:vml" Requires="v">
-                <p:oleObj spid="_x0000_s205957" name="Equation" r:id="rId6" imgW="139700" imgH="215900" progId="Equation.DSMT4">
+                <p:oleObj spid="_x0000_s205970" name="Equation" r:id="rId6" imgW="139700" imgH="215900" progId="Equation.DSMT4">
                   <p:embed/>
                 </p:oleObj>
               </mc:Choice>
@@ -6343,7 +6337,7 @@
           <a:graphicData uri="http://schemas.openxmlformats.org/presentationml/2006/ole">
             <mc:AlternateContent xmlns:mc="http://schemas.openxmlformats.org/markup-compatibility/2006">
               <mc:Choice xmlns:v="urn:schemas-microsoft-com:vml" Requires="v">
-                <p:oleObj spid="_x0000_s205958" name="Equation" r:id="rId7" imgW="1346200" imgH="533400" progId="Equation.DSMT4">
+                <p:oleObj spid="_x0000_s205971" name="Equation" r:id="rId7" imgW="1346200" imgH="533400" progId="Equation.DSMT4">
                   <p:embed/>
                 </p:oleObj>
               </mc:Choice>
@@ -6400,7 +6394,7 @@
           <a:graphicData uri="http://schemas.openxmlformats.org/presentationml/2006/ole">
             <mc:AlternateContent xmlns:mc="http://schemas.openxmlformats.org/markup-compatibility/2006">
               <mc:Choice xmlns:v="urn:schemas-microsoft-com:vml" Requires="v">
-                <p:oleObj spid="_x0000_s205959" name="Equation" r:id="rId9" imgW="482600" imgH="241300" progId="Equation.DSMT4">
+                <p:oleObj spid="_x0000_s205972" name="Equation" r:id="rId9" imgW="482600" imgH="241300" progId="Equation.DSMT4">
                   <p:embed/>
                 </p:oleObj>
               </mc:Choice>
@@ -6445,18 +6439,9 @@
   <p:clrMapOvr>
     <a:masterClrMapping/>
   </p:clrMapOvr>
-  <mc:AlternateContent xmlns:mc="http://schemas.openxmlformats.org/markup-compatibility/2006">
-    <mc:Choice xmlns:p14="http://schemas.microsoft.com/office/powerpoint/2010/main" Requires="p14">
-      <p:transition spd="slow" p14:dur="800" advClick="0">
-        <p:fade thruBlk="1"/>
-      </p:transition>
-    </mc:Choice>
-    <mc:Fallback>
-      <p:transition xmlns:p14="http://schemas.microsoft.com/office/powerpoint/2010/main" spd="slow" advClick="0">
-        <p:fade thruBlk="1"/>
-      </p:transition>
-    </mc:Fallback>
-  </mc:AlternateContent>
+  <p:transition xmlns:p14="http://schemas.microsoft.com/office/powerpoint/2010/main" spd="slow" advClick="0">
+    <p:fade thruBlk="1"/>
+  </p:transition>
   <p:timing>
     <p:tnLst>
       <p:par>
@@ -6783,7 +6768,7 @@
           <a:graphicData uri="http://schemas.openxmlformats.org/presentationml/2006/ole">
             <mc:AlternateContent xmlns:mc="http://schemas.openxmlformats.org/markup-compatibility/2006">
               <mc:Choice xmlns:v="urn:schemas-microsoft-com:vml" Requires="v">
-                <p:oleObj spid="_x0000_s245767" name="Equation" r:id="rId4" imgW="139700" imgH="215900" progId="Equation.DSMT4">
+                <p:oleObj spid="_x0000_s245777" name="Equation" r:id="rId4" imgW="139700" imgH="215900" progId="Equation.DSMT4">
                   <p:embed/>
                 </p:oleObj>
               </mc:Choice>
@@ -6840,7 +6825,7 @@
           <a:graphicData uri="http://schemas.openxmlformats.org/presentationml/2006/ole">
             <mc:AlternateContent xmlns:mc="http://schemas.openxmlformats.org/markup-compatibility/2006">
               <mc:Choice xmlns:v="urn:schemas-microsoft-com:vml" Requires="v">
-                <p:oleObj spid="_x0000_s245768" name="Equation" r:id="rId6" imgW="139700" imgH="215900" progId="Equation.DSMT4">
+                <p:oleObj spid="_x0000_s245778" name="Equation" r:id="rId6" imgW="139700" imgH="215900" progId="Equation.DSMT4">
                   <p:embed/>
                 </p:oleObj>
               </mc:Choice>
@@ -6884,25 +6869,25 @@
           <p:nvPr>
             <p:extLst>
               <p:ext uri="{D42A27DB-BD31-4B8C-83A1-F6EECF244321}">
-                <p14:modId xmlns:p14="http://schemas.microsoft.com/office/powerpoint/2010/main" val="312334529"/>
+                <p14:modId xmlns:p14="http://schemas.microsoft.com/office/powerpoint/2010/main" val="737281621"/>
               </p:ext>
             </p:extLst>
           </p:nvPr>
         </p:nvGraphicFramePr>
         <p:xfrm>
-          <a:off x="152400" y="2593041"/>
-          <a:ext cx="4191000" cy="2588559"/>
+          <a:off x="1752600" y="2133600"/>
+          <a:ext cx="5486400" cy="2452265"/>
         </p:xfrm>
         <a:graphic>
           <a:graphicData uri="http://schemas.openxmlformats.org/presentationml/2006/ole">
             <mc:AlternateContent xmlns:mc="http://schemas.openxmlformats.org/markup-compatibility/2006">
               <mc:Choice xmlns:v="urn:schemas-microsoft-com:vml" Requires="v">
-                <p:oleObj spid="_x0000_s245769" name="Equation" r:id="rId7" imgW="863600" imgH="533400" progId="Equation.DSMT4">
+                <p:oleObj spid="_x0000_s245779" name="Equation" r:id="rId7" imgW="1193800" imgH="533400" progId="Equation.DSMT4">
                   <p:embed/>
                 </p:oleObj>
               </mc:Choice>
               <mc:Fallback>
-                <p:oleObj name="Equation" r:id="rId7" imgW="863600" imgH="533400" progId="Equation.DSMT4">
+                <p:oleObj name="Equation" r:id="rId7" imgW="1193800" imgH="533400" progId="Equation.DSMT4">
                   <p:embed/>
                   <p:pic>
                     <p:nvPicPr>
@@ -6918,8 +6903,8 @@
                     </p:blipFill>
                     <p:spPr>
                       <a:xfrm>
-                        <a:off x="152400" y="2593041"/>
-                        <a:ext cx="4191000" cy="2588559"/>
+                        <a:off x="1752600" y="2133600"/>
+                        <a:ext cx="5486400" cy="2452265"/>
                       </a:xfrm>
                       <a:prstGeom prst="rect">
                         <a:avLst/>
@@ -7182,7 +7167,7 @@
           <p:nvPr>
             <p:extLst>
               <p:ext uri="{D42A27DB-BD31-4B8C-83A1-F6EECF244321}">
-                <p14:modId xmlns:p14="http://schemas.microsoft.com/office/powerpoint/2010/main" val="945755997"/>
+                <p14:modId xmlns:p14="http://schemas.microsoft.com/office/powerpoint/2010/main" val="1039531652"/>
               </p:ext>
             </p:extLst>
           </p:nvPr>
@@ -7195,7 +7180,7 @@
           <a:graphicData uri="http://schemas.openxmlformats.org/presentationml/2006/ole">
             <mc:AlternateContent xmlns:mc="http://schemas.openxmlformats.org/markup-compatibility/2006">
               <mc:Choice xmlns:v="urn:schemas-microsoft-com:vml" Requires="v">
-                <p:oleObj spid="_x0000_s249861" name="Equation" r:id="rId4" imgW="139700" imgH="215900" progId="Equation.DSMT4">
+                <p:oleObj spid="_x0000_s262153" name="Equation" r:id="rId4" imgW="139700" imgH="215900" progId="Equation.DSMT4">
                   <p:embed/>
                 </p:oleObj>
               </mc:Choice>
@@ -7239,7 +7224,7 @@
           <p:nvPr>
             <p:extLst>
               <p:ext uri="{D42A27DB-BD31-4B8C-83A1-F6EECF244321}">
-                <p14:modId xmlns:p14="http://schemas.microsoft.com/office/powerpoint/2010/main" val="2188170612"/>
+                <p14:modId xmlns:p14="http://schemas.microsoft.com/office/powerpoint/2010/main" val="1872430895"/>
               </p:ext>
             </p:extLst>
           </p:nvPr>
@@ -7252,7 +7237,7 @@
           <a:graphicData uri="http://schemas.openxmlformats.org/presentationml/2006/ole">
             <mc:AlternateContent xmlns:mc="http://schemas.openxmlformats.org/markup-compatibility/2006">
               <mc:Choice xmlns:v="urn:schemas-microsoft-com:vml" Requires="v">
-                <p:oleObj spid="_x0000_s249862" name="Equation" r:id="rId6" imgW="139700" imgH="215900" progId="Equation.DSMT4">
+                <p:oleObj spid="_x0000_s262154" name="Equation" r:id="rId6" imgW="139700" imgH="215900" progId="Equation.DSMT4">
                   <p:embed/>
                 </p:oleObj>
               </mc:Choice>
@@ -7296,25 +7281,25 @@
           <p:nvPr>
             <p:extLst>
               <p:ext uri="{D42A27DB-BD31-4B8C-83A1-F6EECF244321}">
-                <p14:modId xmlns:p14="http://schemas.microsoft.com/office/powerpoint/2010/main" val="2059159772"/>
+                <p14:modId xmlns:p14="http://schemas.microsoft.com/office/powerpoint/2010/main" val="1890154747"/>
               </p:ext>
             </p:extLst>
           </p:nvPr>
         </p:nvGraphicFramePr>
         <p:xfrm>
-          <a:off x="152400" y="2593041"/>
-          <a:ext cx="4191000" cy="2588559"/>
+          <a:off x="1752600" y="2133600"/>
+          <a:ext cx="5486400" cy="2452265"/>
         </p:xfrm>
         <a:graphic>
           <a:graphicData uri="http://schemas.openxmlformats.org/presentationml/2006/ole">
             <mc:AlternateContent xmlns:mc="http://schemas.openxmlformats.org/markup-compatibility/2006">
               <mc:Choice xmlns:v="urn:schemas-microsoft-com:vml" Requires="v">
-                <p:oleObj spid="_x0000_s249863" name="Equation" r:id="rId7" imgW="863600" imgH="533400" progId="Equation.DSMT4">
+                <p:oleObj spid="_x0000_s262155" name="Equation" r:id="rId7" imgW="1193800" imgH="533400" progId="Equation.DSMT4">
                   <p:embed/>
                 </p:oleObj>
               </mc:Choice>
               <mc:Fallback>
-                <p:oleObj name="Equation" r:id="rId7" imgW="863600" imgH="533400" progId="Equation.DSMT4">
+                <p:oleObj name="Equation" r:id="rId7" imgW="1193800" imgH="533400" progId="Equation.DSMT4">
                   <p:embed/>
                   <p:pic>
                     <p:nvPicPr>
@@ -7330,8 +7315,8 @@
                     </p:blipFill>
                     <p:spPr>
                       <a:xfrm>
-                        <a:off x="152400" y="2593041"/>
-                        <a:ext cx="4191000" cy="2588559"/>
+                        <a:off x="1752600" y="2133600"/>
+                        <a:ext cx="5486400" cy="2452265"/>
                       </a:xfrm>
                       <a:prstGeom prst="rect">
                         <a:avLst/>
@@ -7353,20 +7338,20 @@
           <p:nvPr>
             <p:extLst>
               <p:ext uri="{D42A27DB-BD31-4B8C-83A1-F6EECF244321}">
-                <p14:modId xmlns:p14="http://schemas.microsoft.com/office/powerpoint/2010/main" val="3634380603"/>
+                <p14:modId xmlns:p14="http://schemas.microsoft.com/office/powerpoint/2010/main" val="1843562763"/>
               </p:ext>
             </p:extLst>
           </p:nvPr>
         </p:nvGraphicFramePr>
         <p:xfrm>
-          <a:off x="4340225" y="3200400"/>
-          <a:ext cx="4498975" cy="1231900"/>
+          <a:off x="3048000" y="4191000"/>
+          <a:ext cx="4535488" cy="1241898"/>
         </p:xfrm>
         <a:graphic>
           <a:graphicData uri="http://schemas.openxmlformats.org/presentationml/2006/ole">
             <mc:AlternateContent xmlns:mc="http://schemas.openxmlformats.org/markup-compatibility/2006">
               <mc:Choice xmlns:v="urn:schemas-microsoft-com:vml" Requires="v">
-                <p:oleObj spid="_x0000_s249864" name="Equation" r:id="rId9" imgW="927100" imgH="254000" progId="Equation.DSMT4">
+                <p:oleObj spid="_x0000_s262156" name="Equation" r:id="rId9" imgW="927100" imgH="254000" progId="Equation.DSMT4">
                   <p:embed/>
                 </p:oleObj>
               </mc:Choice>
@@ -7387,8 +7372,8 @@
                     </p:blipFill>
                     <p:spPr>
                       <a:xfrm>
-                        <a:off x="4340225" y="3200400"/>
-                        <a:ext cx="4498975" cy="1231900"/>
+                        <a:off x="3048000" y="4191000"/>
+                        <a:ext cx="4535488" cy="1241898"/>
                       </a:xfrm>
                       <a:prstGeom prst="rect">
                         <a:avLst/>
@@ -7409,8 +7394,8 @@
         </p:nvSpPr>
         <p:spPr>
           <a:xfrm>
-            <a:off x="3429000" y="4953000"/>
-            <a:ext cx="2464938" cy="1323439"/>
+            <a:off x="5410200" y="5334001"/>
+            <a:ext cx="2362200" cy="1200329"/>
           </a:xfrm>
           <a:prstGeom prst="rect">
             <a:avLst/>
@@ -7418,13 +7403,13 @@
           <a:noFill/>
         </p:spPr>
         <p:txBody>
-          <a:bodyPr wrap="none" rtlCol="0">
+          <a:bodyPr wrap="square" rtlCol="0">
             <a:spAutoFit/>
           </a:bodyPr>
           <a:lstStyle/>
           <a:p>
             <a:r>
-              <a:rPr lang="en-US" sz="8000" dirty="0" smtClean="0">
+              <a:rPr lang="en-US" sz="7200" dirty="0" smtClean="0">
                 <a:solidFill>
                   <a:srgbClr val="008000"/>
                 </a:solidFill>
@@ -7438,14 +7423,14 @@
     </p:spTree>
     <p:extLst>
       <p:ext uri="{BB962C8B-B14F-4D97-AF65-F5344CB8AC3E}">
-        <p14:creationId xmlns:p14="http://schemas.microsoft.com/office/powerpoint/2010/main" val="2703840527"/>
+        <p14:creationId xmlns:p14="http://schemas.microsoft.com/office/powerpoint/2010/main" val="3357704414"/>
       </p:ext>
     </p:extLst>
   </p:cSld>
   <p:clrMapOvr>
     <a:masterClrMapping/>
   </p:clrMapOvr>
-  <p:transition xmlns:p14="http://schemas.microsoft.com/office/powerpoint/2010/main" advClick="0">
+  <p:transition xmlns:p14="http://schemas.microsoft.com/office/powerpoint/2010/main" spd="slow" advClick="0">
     <p:fade/>
   </p:transition>
   <p:timing>
@@ -7460,9 +7445,6 @@
                     <p:cTn id="3" fill="hold">
                       <p:stCondLst>
                         <p:cond delay="indefinite"/>
-                        <p:cond evt="onBegin" delay="0">
-                          <p:tn val="2"/>
-                        </p:cond>
                       </p:stCondLst>
                       <p:childTnLst>
                         <p:par>
@@ -7472,7 +7454,7 @@
                             </p:stCondLst>
                             <p:childTnLst>
                               <p:par>
-                                <p:cTn id="5" presetID="22" presetClass="entr" presetSubtype="8" fill="hold" nodeType="withEffect">
+                                <p:cTn id="5" presetID="15" presetClass="entr" presetSubtype="0" fill="hold" grpId="0" nodeType="clickEffect">
                                   <p:stCondLst>
                                     <p:cond delay="0"/>
                                   </p:stCondLst>
@@ -7480,59 +7462,6 @@
                                     <p:set>
                                       <p:cBhvr>
                                         <p:cTn id="6" dur="1" fill="hold">
-                                          <p:stCondLst>
-                                            <p:cond delay="0"/>
-                                          </p:stCondLst>
-                                        </p:cTn>
-                                        <p:tgtEl>
-                                          <p:spTgt spid="8"/>
-                                        </p:tgtEl>
-                                        <p:attrNameLst>
-                                          <p:attrName>style.visibility</p:attrName>
-                                        </p:attrNameLst>
-                                      </p:cBhvr>
-                                      <p:to>
-                                        <p:strVal val="visible"/>
-                                      </p:to>
-                                    </p:set>
-                                    <p:animEffect transition="in" filter="wipe(left)">
-                                      <p:cBhvr>
-                                        <p:cTn id="7" dur="500"/>
-                                        <p:tgtEl>
-                                          <p:spTgt spid="8"/>
-                                        </p:tgtEl>
-                                      </p:cBhvr>
-                                    </p:animEffect>
-                                  </p:childTnLst>
-                                </p:cTn>
-                              </p:par>
-                            </p:childTnLst>
-                          </p:cTn>
-                        </p:par>
-                      </p:childTnLst>
-                    </p:cTn>
-                  </p:par>
-                  <p:par>
-                    <p:cTn id="8" fill="hold">
-                      <p:stCondLst>
-                        <p:cond delay="indefinite"/>
-                      </p:stCondLst>
-                      <p:childTnLst>
-                        <p:par>
-                          <p:cTn id="9" fill="hold">
-                            <p:stCondLst>
-                              <p:cond delay="0"/>
-                            </p:stCondLst>
-                            <p:childTnLst>
-                              <p:par>
-                                <p:cTn id="10" presetID="15" presetClass="entr" presetSubtype="0" fill="hold" grpId="0" nodeType="clickEffect">
-                                  <p:stCondLst>
-                                    <p:cond delay="0"/>
-                                  </p:stCondLst>
-                                  <p:childTnLst>
-                                    <p:set>
-                                      <p:cBhvr>
-                                        <p:cTn id="11" dur="1" fill="hold">
                                           <p:stCondLst>
                                             <p:cond delay="0"/>
                                           </p:stCondLst>
@@ -7550,7 +7479,7 @@
                                     </p:set>
                                     <p:anim calcmode="lin" valueType="num">
                                       <p:cBhvr>
-                                        <p:cTn id="12" dur="1000" fill="hold"/>
+                                        <p:cTn id="7" dur="1000" fill="hold"/>
                                         <p:tgtEl>
                                           <p:spTgt spid="9"/>
                                         </p:tgtEl>
@@ -7573,7 +7502,7 @@
                                     </p:anim>
                                     <p:anim calcmode="lin" valueType="num">
                                       <p:cBhvr>
-                                        <p:cTn id="13" dur="1000" fill="hold"/>
+                                        <p:cTn id="8" dur="1000" fill="hold"/>
                                         <p:tgtEl>
                                           <p:spTgt spid="9"/>
                                         </p:tgtEl>
@@ -7596,7 +7525,7 @@
                                     </p:anim>
                                     <p:anim calcmode="lin" valueType="num">
                                       <p:cBhvr>
-                                        <p:cTn id="14" dur="1000" fill="hold"/>
+                                        <p:cTn id="9" dur="1000" fill="hold"/>
                                         <p:tgtEl>
                                           <p:spTgt spid="9"/>
                                         </p:tgtEl>
@@ -7619,7 +7548,7 @@
                                     </p:anim>
                                     <p:anim calcmode="lin" valueType="num">
                                       <p:cBhvr>
-                                        <p:cTn id="15" dur="1000" fill="hold"/>
+                                        <p:cTn id="10" dur="1000" fill="hold"/>
                                         <p:tgtEl>
                                           <p:spTgt spid="9"/>
                                         </p:tgtEl>
@@ -7716,7 +7645,7 @@
           <a:graphicData uri="http://schemas.openxmlformats.org/presentationml/2006/ole">
             <mc:AlternateContent xmlns:mc="http://schemas.openxmlformats.org/markup-compatibility/2006">
               <mc:Choice xmlns:v="urn:schemas-microsoft-com:vml" Requires="v">
-                <p:oleObj spid="_x0000_s1047" name="Equation" r:id="rId4" imgW="1346200" imgH="266700" progId="Equation.DSMT4">
+                <p:oleObj spid="_x0000_s1054" name="Equation" r:id="rId4" imgW="1346200" imgH="266700" progId="Equation.DSMT4">
                   <p:embed/>
                 </p:oleObj>
               </mc:Choice>
@@ -7786,7 +7715,7 @@
           <a:graphicData uri="http://schemas.openxmlformats.org/presentationml/2006/ole">
             <mc:AlternateContent xmlns:mc="http://schemas.openxmlformats.org/markup-compatibility/2006">
               <mc:Choice xmlns:v="urn:schemas-microsoft-com:vml" Requires="v">
-                <p:oleObj spid="_x0000_s1048" name="Equation" r:id="rId6" imgW="1447800" imgH="495300" progId="Equation.DSMT4">
+                <p:oleObj spid="_x0000_s1055" name="Equation" r:id="rId6" imgW="1447800" imgH="495300" progId="Equation.DSMT4">
                   <p:embed/>
                 </p:oleObj>
               </mc:Choice>
@@ -8142,7 +8071,7 @@
           <a:graphicData uri="http://schemas.openxmlformats.org/presentationml/2006/ole">
             <mc:AlternateContent xmlns:mc="http://schemas.openxmlformats.org/markup-compatibility/2006">
               <mc:Choice xmlns:v="urn:schemas-microsoft-com:vml" Requires="v">
-                <p:oleObj spid="_x0000_s5268" name="Equation" r:id="rId4" imgW="139700" imgH="215900" progId="Equation.DSMT4">
+                <p:oleObj spid="_x0000_s5281" name="Equation" r:id="rId4" imgW="139700" imgH="215900" progId="Equation.DSMT4">
                   <p:embed/>
                 </p:oleObj>
               </mc:Choice>
@@ -8199,7 +8128,7 @@
           <a:graphicData uri="http://schemas.openxmlformats.org/presentationml/2006/ole">
             <mc:AlternateContent xmlns:mc="http://schemas.openxmlformats.org/markup-compatibility/2006">
               <mc:Choice xmlns:v="urn:schemas-microsoft-com:vml" Requires="v">
-                <p:oleObj spid="_x0000_s5269" name="Equation" r:id="rId6" imgW="571500" imgH="203200" progId="Equation.DSMT4">
+                <p:oleObj spid="_x0000_s5282" name="Equation" r:id="rId6" imgW="571500" imgH="203200" progId="Equation.DSMT4">
                   <p:embed/>
                 </p:oleObj>
               </mc:Choice>
@@ -8256,7 +8185,7 @@
           <a:graphicData uri="http://schemas.openxmlformats.org/presentationml/2006/ole">
             <mc:AlternateContent xmlns:mc="http://schemas.openxmlformats.org/markup-compatibility/2006">
               <mc:Choice xmlns:v="urn:schemas-microsoft-com:vml" Requires="v">
-                <p:oleObj spid="_x0000_s5270" name="Equation" r:id="rId8" imgW="1612900" imgH="393700" progId="Equation.DSMT4">
+                <p:oleObj spid="_x0000_s5283" name="Equation" r:id="rId8" imgW="1612900" imgH="393700" progId="Equation.DSMT4">
                   <p:embed/>
                 </p:oleObj>
               </mc:Choice>
@@ -8313,7 +8242,7 @@
           <a:graphicData uri="http://schemas.openxmlformats.org/presentationml/2006/ole">
             <mc:AlternateContent xmlns:mc="http://schemas.openxmlformats.org/markup-compatibility/2006">
               <mc:Choice xmlns:v="urn:schemas-microsoft-com:vml" Requires="v">
-                <p:oleObj spid="_x0000_s5271" name="Equation" r:id="rId10" imgW="1549400" imgH="292100" progId="Equation.DSMT4">
+                <p:oleObj spid="_x0000_s5284" name="Equation" r:id="rId10" imgW="1549400" imgH="292100" progId="Equation.DSMT4">
                   <p:embed/>
                 </p:oleObj>
               </mc:Choice>
@@ -8353,13 +8282,13 @@
   <p:clrMapOvr>
     <a:masterClrMapping/>
   </p:clrMapOvr>
-  <mc:AlternateContent xmlns:mc="http://schemas.openxmlformats.org/markup-compatibility/2006">
-    <mc:Choice xmlns:p14="http://schemas.microsoft.com/office/powerpoint/2010/main" Requires="p14">
+  <mc:AlternateContent xmlns:mc="http://schemas.openxmlformats.org/markup-compatibility/2006" xmlns:p14="http://schemas.microsoft.com/office/powerpoint/2010/main">
+    <mc:Choice Requires="p14">
       <p:transition spd="slow" p14:dur="1100" advClick="0">
         <p:fade/>
       </p:transition>
     </mc:Choice>
-    <mc:Fallback>
+    <mc:Fallback xmlns="">
       <p:transition xmlns:p14="http://schemas.microsoft.com/office/powerpoint/2010/main" spd="slow" advClick="0">
         <p:fade/>
       </p:transition>
@@ -8543,7 +8472,7 @@
           <a:graphicData uri="http://schemas.openxmlformats.org/presentationml/2006/ole">
             <mc:AlternateContent xmlns:mc="http://schemas.openxmlformats.org/markup-compatibility/2006">
               <mc:Choice xmlns:v="urn:schemas-microsoft-com:vml" Requires="v">
-                <p:oleObj spid="_x0000_s213019" name="Equation" r:id="rId4" imgW="1346200" imgH="266700" progId="Equation.DSMT4">
+                <p:oleObj spid="_x0000_s213026" name="Equation" r:id="rId4" imgW="1346200" imgH="266700" progId="Equation.DSMT4">
                   <p:embed/>
                 </p:oleObj>
               </mc:Choice>
@@ -8698,7 +8627,7 @@
           <a:graphicData uri="http://schemas.openxmlformats.org/presentationml/2006/ole">
             <mc:AlternateContent xmlns:mc="http://schemas.openxmlformats.org/markup-compatibility/2006">
               <mc:Choice xmlns:v="urn:schemas-microsoft-com:vml" Requires="v">
-                <p:oleObj spid="_x0000_s213020" name="Equation" r:id="rId6" imgW="1447800" imgH="495300" progId="Equation.DSMT4">
+                <p:oleObj spid="_x0000_s213027" name="Equation" r:id="rId6" imgW="1447800" imgH="495300" progId="Equation.DSMT4">
                   <p:embed/>
                 </p:oleObj>
               </mc:Choice>
@@ -8902,7 +8831,7 @@
           <a:graphicData uri="http://schemas.openxmlformats.org/presentationml/2006/ole">
             <mc:AlternateContent xmlns:mc="http://schemas.openxmlformats.org/markup-compatibility/2006">
               <mc:Choice xmlns:v="urn:schemas-microsoft-com:vml" Requires="v">
-                <p:oleObj spid="_x0000_s214033" name="Equation" r:id="rId4" imgW="393700" imgH="266700" progId="Equation.DSMT4">
+                <p:oleObj spid="_x0000_s214040" name="Equation" r:id="rId4" imgW="393700" imgH="266700" progId="Equation.DSMT4">
                   <p:embed/>
                 </p:oleObj>
               </mc:Choice>
@@ -8972,7 +8901,7 @@
           <a:graphicData uri="http://schemas.openxmlformats.org/presentationml/2006/ole">
             <mc:AlternateContent xmlns:mc="http://schemas.openxmlformats.org/markup-compatibility/2006">
               <mc:Choice xmlns:v="urn:schemas-microsoft-com:vml" Requires="v">
-                <p:oleObj spid="_x0000_s214034" name="Equation" r:id="rId6" imgW="1447800" imgH="495300" progId="Equation.DSMT4">
+                <p:oleObj spid="_x0000_s214041" name="Equation" r:id="rId6" imgW="1447800" imgH="495300" progId="Equation.DSMT4">
                   <p:embed/>
                 </p:oleObj>
               </mc:Choice>
@@ -9167,7 +9096,7 @@
           <a:graphicData uri="http://schemas.openxmlformats.org/presentationml/2006/ole">
             <mc:AlternateContent xmlns:mc="http://schemas.openxmlformats.org/markup-compatibility/2006">
               <mc:Choice xmlns:v="urn:schemas-microsoft-com:vml" Requires="v">
-                <p:oleObj spid="_x0000_s216083" name="Equation" r:id="rId4" imgW="393700" imgH="266700" progId="Equation.DSMT4">
+                <p:oleObj spid="_x0000_s216090" name="Equation" r:id="rId4" imgW="393700" imgH="266700" progId="Equation.DSMT4">
                   <p:embed/>
                 </p:oleObj>
               </mc:Choice>
@@ -9237,7 +9166,7 @@
           <a:graphicData uri="http://schemas.openxmlformats.org/presentationml/2006/ole">
             <mc:AlternateContent xmlns:mc="http://schemas.openxmlformats.org/markup-compatibility/2006">
               <mc:Choice xmlns:v="urn:schemas-microsoft-com:vml" Requires="v">
-                <p:oleObj spid="_x0000_s216084" name="Equation" r:id="rId6" imgW="1308100" imgH="419100" progId="Equation.DSMT4">
+                <p:oleObj spid="_x0000_s216091" name="Equation" r:id="rId6" imgW="1308100" imgH="419100" progId="Equation.DSMT4">
                   <p:embed/>
                 </p:oleObj>
               </mc:Choice>
@@ -9424,7 +9353,7 @@
           <a:graphicData uri="http://schemas.openxmlformats.org/presentationml/2006/ole">
             <mc:AlternateContent xmlns:mc="http://schemas.openxmlformats.org/markup-compatibility/2006">
               <mc:Choice xmlns:v="urn:schemas-microsoft-com:vml" Requires="v">
-                <p:oleObj spid="_x0000_s248835" name="Equation" r:id="rId4" imgW="393700" imgH="266700" progId="Equation.DSMT4">
+                <p:oleObj spid="_x0000_s248842" name="Equation" r:id="rId4" imgW="393700" imgH="266700" progId="Equation.DSMT4">
                   <p:embed/>
                 </p:oleObj>
               </mc:Choice>
@@ -9494,7 +9423,7 @@
           <a:graphicData uri="http://schemas.openxmlformats.org/presentationml/2006/ole">
             <mc:AlternateContent xmlns:mc="http://schemas.openxmlformats.org/markup-compatibility/2006">
               <mc:Choice xmlns:v="urn:schemas-microsoft-com:vml" Requires="v">
-                <p:oleObj spid="_x0000_s248836" name="Equation" r:id="rId6" imgW="1308100" imgH="419100" progId="Equation.DSMT4">
+                <p:oleObj spid="_x0000_s248843" name="Equation" r:id="rId6" imgW="1308100" imgH="419100" progId="Equation.DSMT4">
                   <p:embed/>
                 </p:oleObj>
               </mc:Choice>
@@ -9681,7 +9610,7 @@
           <a:graphicData uri="http://schemas.openxmlformats.org/presentationml/2006/ole">
             <mc:AlternateContent xmlns:mc="http://schemas.openxmlformats.org/markup-compatibility/2006">
               <mc:Choice xmlns:v="urn:schemas-microsoft-com:vml" Requires="v">
-                <p:oleObj spid="_x0000_s217105" name="Equation" r:id="rId4" imgW="241300" imgH="152400" progId="Equation.DSMT4">
+                <p:oleObj spid="_x0000_s217112" name="Equation" r:id="rId4" imgW="241300" imgH="152400" progId="Equation.DSMT4">
                   <p:embed/>
                 </p:oleObj>
               </mc:Choice>
@@ -9751,7 +9680,7 @@
           <a:graphicData uri="http://schemas.openxmlformats.org/presentationml/2006/ole">
             <mc:AlternateContent xmlns:mc="http://schemas.openxmlformats.org/markup-compatibility/2006">
               <mc:Choice xmlns:v="urn:schemas-microsoft-com:vml" Requires="v">
-                <p:oleObj spid="_x0000_s217106" name="Equation" r:id="rId6" imgW="1181100" imgH="419100" progId="Equation.DSMT4">
+                <p:oleObj spid="_x0000_s217113" name="Equation" r:id="rId6" imgW="1181100" imgH="419100" progId="Equation.DSMT4">
                   <p:embed/>
                 </p:oleObj>
               </mc:Choice>
@@ -9938,7 +9867,7 @@
           <a:graphicData uri="http://schemas.openxmlformats.org/presentationml/2006/ole">
             <mc:AlternateContent xmlns:mc="http://schemas.openxmlformats.org/markup-compatibility/2006">
               <mc:Choice xmlns:v="urn:schemas-microsoft-com:vml" Requires="v">
-                <p:oleObj spid="_x0000_s235534" name="Equation" r:id="rId4" imgW="1320800" imgH="419100" progId="Equation.DSMT4">
+                <p:oleObj spid="_x0000_s235547" name="Equation" r:id="rId4" imgW="1320800" imgH="419100" progId="Equation.DSMT4">
                   <p:embed/>
                 </p:oleObj>
               </mc:Choice>
@@ -10063,7 +9992,7 @@
           <a:graphicData uri="http://schemas.openxmlformats.org/presentationml/2006/ole">
             <mc:AlternateContent xmlns:mc="http://schemas.openxmlformats.org/markup-compatibility/2006">
               <mc:Choice xmlns:v="urn:schemas-microsoft-com:vml" Requires="v">
-                <p:oleObj spid="_x0000_s235535" name="Equation" r:id="rId6" imgW="139700" imgH="215900" progId="Equation.DSMT4">
+                <p:oleObj spid="_x0000_s235548" name="Equation" r:id="rId6" imgW="139700" imgH="215900" progId="Equation.DSMT4">
                   <p:embed/>
                 </p:oleObj>
               </mc:Choice>
@@ -10120,7 +10049,7 @@
           <a:graphicData uri="http://schemas.openxmlformats.org/presentationml/2006/ole">
             <mc:AlternateContent xmlns:mc="http://schemas.openxmlformats.org/markup-compatibility/2006">
               <mc:Choice xmlns:v="urn:schemas-microsoft-com:vml" Requires="v">
-                <p:oleObj spid="_x0000_s235536" name="Equation" r:id="rId8" imgW="139700" imgH="215900" progId="Equation.DSMT4">
+                <p:oleObj spid="_x0000_s235549" name="Equation" r:id="rId8" imgW="139700" imgH="215900" progId="Equation.DSMT4">
                   <p:embed/>
                 </p:oleObj>
               </mc:Choice>
@@ -10177,7 +10106,7 @@
           <a:graphicData uri="http://schemas.openxmlformats.org/presentationml/2006/ole">
             <mc:AlternateContent xmlns:mc="http://schemas.openxmlformats.org/markup-compatibility/2006">
               <mc:Choice xmlns:v="urn:schemas-microsoft-com:vml" Requires="v">
-                <p:oleObj spid="_x0000_s235537" name="Equation" r:id="rId9" imgW="1295400" imgH="596900" progId="Equation.DSMT4">
+                <p:oleObj spid="_x0000_s235550" name="Equation" r:id="rId9" imgW="1295400" imgH="596900" progId="Equation.DSMT4">
                   <p:embed/>
                 </p:oleObj>
               </mc:Choice>

</xml_diff>